<commit_message>
Update IR extension link
</commit_message>
<xml_diff>
--- a/0.Preparation before class/Computer programming.pptx
+++ b/0.Preparation before class/Computer programming.pptx
@@ -21028,7 +21028,7 @@
         <p:spPr>
           <a:xfrm>
             <a:off x="2800985" y="1150620"/>
-            <a:ext cx="8590915" cy="645160"/>
+            <a:ext cx="8590915" cy="914400"/>
           </a:xfrm>
           <a:prstGeom prst="rect">
             <a:avLst/>
@@ -21093,6 +21093,57 @@
             </a:endParaRPr>
           </a:p>
           <a:p>
+            <a:r>
+              <a:rPr lang="en-US">
+                <a:solidFill>
+                  <a:schemeClr val="accent1"/>
+                </a:solidFill>
+                <a:effectLst>
+                  <a:outerShdw blurRad="38100" dist="25400" dir="5400000" algn="ctr" rotWithShape="0">
+                    <a:srgbClr val="6E747A">
+                      <a:alpha val="43000"/>
+                    </a:srgbClr>
+                  </a:outerShdw>
+                </a:effectLst>
+                <a:latin typeface="Arial" pitchFamily="34" charset="0"/>
+                <a:ea typeface="Arial" pitchFamily="34" charset="0"/>
+              </a:rPr>
+              <a:t>and </a:t>
+            </a:r>
+            <a:r>
+              <a:rPr lang="zh-CN" altLang="en-US">
+                <a:solidFill>
+                  <a:srgbClr val="FF0000"/>
+                </a:solidFill>
+                <a:effectLst>
+                  <a:outerShdw blurRad="38100" dist="25400" dir="5400000" algn="ctr" rotWithShape="0">
+                    <a:srgbClr val="6E747A">
+                      <a:alpha val="43000"/>
+                    </a:srgbClr>
+                  </a:outerShdw>
+                </a:effectLst>
+                <a:latin typeface="Arial" pitchFamily="34" charset="0"/>
+                <a:ea typeface="Arial" pitchFamily="34" charset="0"/>
+              </a:rPr>
+              <a:t>https://github.com/YahboomTechnology/Yahboom_IR</a:t>
+            </a:r>
+            <a:r>
+              <a:rPr lang="en-US">
+                <a:solidFill>
+                  <a:schemeClr val="accent1"/>
+                </a:solidFill>
+                <a:effectLst>
+                  <a:outerShdw blurRad="38100" dist="25400" dir="5400000" algn="ctr" rotWithShape="0">
+                    <a:srgbClr val="6E747A">
+                      <a:alpha val="43000"/>
+                    </a:srgbClr>
+                  </a:outerShdw>
+                </a:effectLst>
+                <a:latin typeface="Arial" pitchFamily="34" charset="0"/>
+                <a:ea typeface="Arial" pitchFamily="34" charset="0"/>
+              </a:rPr>
+              <a:t> </a:t>
+            </a:r>
             <a:r>
               <a:rPr>
                 <a:solidFill>

</xml_diff>